<commit_message>
finished very rough draft of results
</commit_message>
<xml_diff>
--- a/Manuscript/Results_Brainstorm.pptx
+++ b/Manuscript/Results_Brainstorm.pptx
@@ -8,7 +8,6 @@
     <p:sldId id="256" r:id="rId2"/>
     <p:sldId id="258" r:id="rId3"/>
     <p:sldId id="257" r:id="rId4"/>
-    <p:sldId id="260" r:id="rId5"/>
   </p:sldIdLst>
   <p:sldSz cx="12192000" cy="6858000"/>
   <p:notesSz cx="6858000" cy="9144000"/>
@@ -4057,8 +4056,8 @@
         </p:blipFill>
         <p:spPr>
           <a:xfrm>
-            <a:off x="5466073" y="2514596"/>
-            <a:ext cx="6400813" cy="3657607"/>
+            <a:off x="6342380" y="2721909"/>
+            <a:ext cx="5303533" cy="3030590"/>
           </a:xfrm>
           <a:prstGeom prst="rect">
             <a:avLst/>
@@ -4135,89 +4134,6 @@
     <p:extLst>
       <p:ext uri="{BB962C8B-B14F-4D97-AF65-F5344CB8AC3E}">
         <p14:creationId xmlns:p14="http://schemas.microsoft.com/office/powerpoint/2010/main" val="3958442668"/>
-      </p:ext>
-    </p:extLst>
-  </p:cSld>
-  <p:clrMapOvr>
-    <a:masterClrMapping/>
-  </p:clrMapOvr>
-</p:sld>
-</file>
-
-<file path=ppt/slides/slide4.xml><?xml version="1.0" encoding="utf-8"?>
-<p:sld xmlns:a="http://schemas.openxmlformats.org/drawingml/2006/main" xmlns:r="http://schemas.openxmlformats.org/officeDocument/2006/relationships" xmlns:p="http://schemas.openxmlformats.org/presentationml/2006/main">
-  <p:cSld>
-    <p:spTree>
-      <p:nvGrpSpPr>
-        <p:cNvPr id="1" name=""/>
-        <p:cNvGrpSpPr/>
-        <p:nvPr/>
-      </p:nvGrpSpPr>
-      <p:grpSpPr>
-        <a:xfrm>
-          <a:off x="0" y="0"/>
-          <a:ext cx="0" cy="0"/>
-          <a:chOff x="0" y="0"/>
-          <a:chExt cx="0" cy="0"/>
-        </a:xfrm>
-      </p:grpSpPr>
-      <p:sp>
-        <p:nvSpPr>
-          <p:cNvPr id="2" name="Title 1">
-            <a:extLst>
-              <a:ext uri="{FF2B5EF4-FFF2-40B4-BE49-F238E27FC236}">
-                <a16:creationId xmlns:a16="http://schemas.microsoft.com/office/drawing/2014/main" id="{B0FF7DFC-BE6E-AE3C-328E-60552DB786DB}"/>
-              </a:ext>
-            </a:extLst>
-          </p:cNvPr>
-          <p:cNvSpPr>
-            <a:spLocks noGrp="1"/>
-          </p:cNvSpPr>
-          <p:nvPr>
-            <p:ph type="title"/>
-          </p:nvPr>
-        </p:nvSpPr>
-        <p:spPr/>
-        <p:txBody>
-          <a:bodyPr/>
-          <a:lstStyle/>
-          <a:p>
-            <a:r>
-              <a:rPr lang="en-CA" dirty="0"/>
-              <a:t>Final curve – all hf individuals with bootstrap</a:t>
-            </a:r>
-          </a:p>
-        </p:txBody>
-      </p:sp>
-      <p:sp>
-        <p:nvSpPr>
-          <p:cNvPr id="3" name="Content Placeholder 2">
-            <a:extLst>
-              <a:ext uri="{FF2B5EF4-FFF2-40B4-BE49-F238E27FC236}">
-                <a16:creationId xmlns:a16="http://schemas.microsoft.com/office/drawing/2014/main" id="{10ADAA6B-DBAA-BD7C-3CB9-5712CBEDBF2D}"/>
-              </a:ext>
-            </a:extLst>
-          </p:cNvPr>
-          <p:cNvSpPr>
-            <a:spLocks noGrp="1"/>
-          </p:cNvSpPr>
-          <p:nvPr>
-            <p:ph idx="1"/>
-          </p:nvPr>
-        </p:nvSpPr>
-        <p:spPr/>
-        <p:txBody>
-          <a:bodyPr/>
-          <a:lstStyle/>
-          <a:p>
-            <a:endParaRPr lang="en-CA" dirty="0"/>
-          </a:p>
-        </p:txBody>
-      </p:sp>
-    </p:spTree>
-    <p:extLst>
-      <p:ext uri="{BB962C8B-B14F-4D97-AF65-F5344CB8AC3E}">
-        <p14:creationId xmlns:p14="http://schemas.microsoft.com/office/powerpoint/2010/main" val="2321837858"/>
       </p:ext>
     </p:extLst>
   </p:cSld>

</xml_diff>